<commit_message>
Converted list to dictionary using LINQ
</commit_message>
<xml_diff>
--- a/notes/get partner details logics implemented.pptx
+++ b/notes/get partner details logics implemented.pptx
@@ -13,11 +13,12 @@
     <p:sldId id="263" r:id="rId7"/>
     <p:sldId id="262" r:id="rId8"/>
     <p:sldId id="264" r:id="rId9"/>
-    <p:sldId id="265" r:id="rId10"/>
-    <p:sldId id="267" r:id="rId11"/>
-    <p:sldId id="266" r:id="rId12"/>
-    <p:sldId id="268" r:id="rId13"/>
-    <p:sldId id="269" r:id="rId14"/>
+    <p:sldId id="270" r:id="rId10"/>
+    <p:sldId id="265" r:id="rId11"/>
+    <p:sldId id="267" r:id="rId12"/>
+    <p:sldId id="266" r:id="rId13"/>
+    <p:sldId id="268" r:id="rId14"/>
+    <p:sldId id="269" r:id="rId15"/>
   </p:sldIdLst>
   <p:sldSz cx="12192000" cy="6858000"/>
   <p:notesSz cx="6858000" cy="9144000"/>
@@ -116,6 +117,11 @@
       </a:defRPr>
     </a:lvl9pPr>
   </p:defaultTextStyle>
+  <p:extLst>
+    <p:ext uri="{EFAFB233-063F-42B5-8137-9DF3F51BA10A}">
+      <p15:sldGuideLst xmlns:p15="http://schemas.microsoft.com/office/powerpoint/2012/main"/>
+    </p:ext>
+  </p:extLst>
 </p:presentation>
 </file>
 
@@ -897,7 +903,7 @@
           <a:p>
             <a:fld id="{3FF8D565-5F73-4F60-8A63-1AE02986B8ED}" type="datetimeFigureOut">
               <a:rPr lang="en-US" smtClean="0"/>
-              <a:t>1/22/2026</a:t>
+              <a:t>1/23/2026</a:t>
             </a:fld>
             <a:endParaRPr lang="en-US"/>
           </a:p>
@@ -1148,7 +1154,7 @@
           <a:p>
             <a:fld id="{3FF8D565-5F73-4F60-8A63-1AE02986B8ED}" type="datetimeFigureOut">
               <a:rPr lang="en-US" smtClean="0"/>
-              <a:t>1/22/2026</a:t>
+              <a:t>1/23/2026</a:t>
             </a:fld>
             <a:endParaRPr lang="en-US"/>
           </a:p>
@@ -1462,7 +1468,7 @@
           <a:p>
             <a:fld id="{3FF8D565-5F73-4F60-8A63-1AE02986B8ED}" type="datetimeFigureOut">
               <a:rPr lang="en-US" smtClean="0"/>
-              <a:t>1/22/2026</a:t>
+              <a:t>1/23/2026</a:t>
             </a:fld>
             <a:endParaRPr lang="en-US"/>
           </a:p>
@@ -1803,7 +1809,7 @@
           <a:p>
             <a:fld id="{3FF8D565-5F73-4F60-8A63-1AE02986B8ED}" type="datetimeFigureOut">
               <a:rPr lang="en-US" smtClean="0"/>
-              <a:t>1/22/2026</a:t>
+              <a:t>1/23/2026</a:t>
             </a:fld>
             <a:endParaRPr lang="en-US"/>
           </a:p>
@@ -2117,7 +2123,7 @@
           <a:p>
             <a:fld id="{3FF8D565-5F73-4F60-8A63-1AE02986B8ED}" type="datetimeFigureOut">
               <a:rPr lang="en-US" smtClean="0"/>
-              <a:t>1/22/2026</a:t>
+              <a:t>1/23/2026</a:t>
             </a:fld>
             <a:endParaRPr lang="en-US"/>
           </a:p>
@@ -2510,7 +2516,7 @@
           <a:p>
             <a:fld id="{3FF8D565-5F73-4F60-8A63-1AE02986B8ED}" type="datetimeFigureOut">
               <a:rPr lang="en-US" smtClean="0"/>
-              <a:t>1/22/2026</a:t>
+              <a:t>1/23/2026</a:t>
             </a:fld>
             <a:endParaRPr lang="en-US"/>
           </a:p>
@@ -2680,7 +2686,7 @@
           <a:p>
             <a:fld id="{3FF8D565-5F73-4F60-8A63-1AE02986B8ED}" type="datetimeFigureOut">
               <a:rPr lang="en-US" smtClean="0"/>
-              <a:t>1/22/2026</a:t>
+              <a:t>1/23/2026</a:t>
             </a:fld>
             <a:endParaRPr lang="en-US"/>
           </a:p>
@@ -2860,7 +2866,7 @@
           <a:p>
             <a:fld id="{3FF8D565-5F73-4F60-8A63-1AE02986B8ED}" type="datetimeFigureOut">
               <a:rPr lang="en-US" smtClean="0"/>
-              <a:t>1/22/2026</a:t>
+              <a:t>1/23/2026</a:t>
             </a:fld>
             <a:endParaRPr lang="en-US"/>
           </a:p>
@@ -3036,7 +3042,7 @@
           <a:p>
             <a:fld id="{3FF8D565-5F73-4F60-8A63-1AE02986B8ED}" type="datetimeFigureOut">
               <a:rPr lang="en-US" smtClean="0"/>
-              <a:t>1/22/2026</a:t>
+              <a:t>1/23/2026</a:t>
             </a:fld>
             <a:endParaRPr lang="en-US"/>
           </a:p>
@@ -3283,7 +3289,7 @@
           <a:p>
             <a:fld id="{3FF8D565-5F73-4F60-8A63-1AE02986B8ED}" type="datetimeFigureOut">
               <a:rPr lang="en-US" smtClean="0"/>
-              <a:t>1/22/2026</a:t>
+              <a:t>1/23/2026</a:t>
             </a:fld>
             <a:endParaRPr lang="en-US"/>
           </a:p>
@@ -3515,7 +3521,7 @@
           <a:p>
             <a:fld id="{3FF8D565-5F73-4F60-8A63-1AE02986B8ED}" type="datetimeFigureOut">
               <a:rPr lang="en-US" smtClean="0"/>
-              <a:t>1/22/2026</a:t>
+              <a:t>1/23/2026</a:t>
             </a:fld>
             <a:endParaRPr lang="en-US"/>
           </a:p>
@@ -3889,7 +3895,7 @@
           <a:p>
             <a:fld id="{3FF8D565-5F73-4F60-8A63-1AE02986B8ED}" type="datetimeFigureOut">
               <a:rPr lang="en-US" smtClean="0"/>
-              <a:t>1/22/2026</a:t>
+              <a:t>1/23/2026</a:t>
             </a:fld>
             <a:endParaRPr lang="en-US"/>
           </a:p>
@@ -4012,7 +4018,7 @@
           <a:p>
             <a:fld id="{3FF8D565-5F73-4F60-8A63-1AE02986B8ED}" type="datetimeFigureOut">
               <a:rPr lang="en-US" smtClean="0"/>
-              <a:t>1/22/2026</a:t>
+              <a:t>1/23/2026</a:t>
             </a:fld>
             <a:endParaRPr lang="en-US"/>
           </a:p>
@@ -4107,7 +4113,7 @@
           <a:p>
             <a:fld id="{3FF8D565-5F73-4F60-8A63-1AE02986B8ED}" type="datetimeFigureOut">
               <a:rPr lang="en-US" smtClean="0"/>
-              <a:t>1/22/2026</a:t>
+              <a:t>1/23/2026</a:t>
             </a:fld>
             <a:endParaRPr lang="en-US"/>
           </a:p>
@@ -4362,7 +4368,7 @@
           <a:p>
             <a:fld id="{3FF8D565-5F73-4F60-8A63-1AE02986B8ED}" type="datetimeFigureOut">
               <a:rPr lang="en-US" smtClean="0"/>
-              <a:t>1/22/2026</a:t>
+              <a:t>1/23/2026</a:t>
             </a:fld>
             <a:endParaRPr lang="en-US"/>
           </a:p>
@@ -4625,7 +4631,7 @@
           <a:p>
             <a:fld id="{3FF8D565-5F73-4F60-8A63-1AE02986B8ED}" type="datetimeFigureOut">
               <a:rPr lang="en-US" smtClean="0"/>
-              <a:t>1/22/2026</a:t>
+              <a:t>1/23/2026</a:t>
             </a:fld>
             <a:endParaRPr lang="en-US"/>
           </a:p>
@@ -5424,7 +5430,7 @@
           <a:p>
             <a:fld id="{3FF8D565-5F73-4F60-8A63-1AE02986B8ED}" type="datetimeFigureOut">
               <a:rPr lang="en-US" smtClean="0"/>
-              <a:t>1/22/2026</a:t>
+              <a:t>1/23/2026</a:t>
             </a:fld>
             <a:endParaRPr lang="en-US"/>
           </a:p>
@@ -6049,6 +6055,252 @@
           <p:cNvPr id="2" name="Title 1">
             <a:extLst>
               <a:ext uri="{FF2B5EF4-FFF2-40B4-BE49-F238E27FC236}">
+                <a16:creationId xmlns:a16="http://schemas.microsoft.com/office/drawing/2014/main" id="{5FCFCA12-4B9A-49F2-7998-485A0D8F28A4}"/>
+              </a:ext>
+            </a:extLst>
+          </p:cNvPr>
+          <p:cNvSpPr>
+            <a:spLocks noGrp="1"/>
+          </p:cNvSpPr>
+          <p:nvPr>
+            <p:ph type="title"/>
+          </p:nvPr>
+        </p:nvSpPr>
+        <p:spPr>
+          <a:xfrm>
+            <a:off x="677334" y="609600"/>
+            <a:ext cx="8596668" cy="674914"/>
+          </a:xfrm>
+        </p:spPr>
+        <p:txBody>
+          <a:bodyPr/>
+          <a:lstStyle/>
+          <a:p>
+            <a:r>
+              <a:rPr lang="en-US" dirty="0"/>
+              <a:t>Dependency injection:</a:t>
+            </a:r>
+          </a:p>
+        </p:txBody>
+      </p:sp>
+      <p:sp>
+        <p:nvSpPr>
+          <p:cNvPr id="3" name="Content Placeholder 2">
+            <a:extLst>
+              <a:ext uri="{FF2B5EF4-FFF2-40B4-BE49-F238E27FC236}">
+                <a16:creationId xmlns:a16="http://schemas.microsoft.com/office/drawing/2014/main" id="{75F0B9BD-D0EB-D1A1-FEFB-8FF709A0A44B}"/>
+              </a:ext>
+            </a:extLst>
+          </p:cNvPr>
+          <p:cNvSpPr>
+            <a:spLocks noGrp="1"/>
+          </p:cNvSpPr>
+          <p:nvPr>
+            <p:ph idx="1"/>
+          </p:nvPr>
+        </p:nvSpPr>
+        <p:spPr>
+          <a:xfrm>
+            <a:off x="677333" y="1480457"/>
+            <a:ext cx="9239553" cy="1687286"/>
+          </a:xfrm>
+        </p:spPr>
+        <p:txBody>
+          <a:bodyPr>
+            <a:normAutofit/>
+          </a:bodyPr>
+          <a:lstStyle/>
+          <a:p>
+            <a:r>
+              <a:rPr lang="en-US" sz="1400" dirty="0"/>
+              <a:t>Dependency Injection means dependencies are provided to a class from outside instead of being created inside the class.</a:t>
+            </a:r>
+          </a:p>
+          <a:p>
+            <a:r>
+              <a:rPr lang="en-US" sz="1400" dirty="0"/>
+              <a:t>Here, </a:t>
+            </a:r>
+            <a:r>
+              <a:rPr lang="en-US" sz="1400" dirty="0" err="1"/>
+              <a:t>ExcelDataSource</a:t>
+            </a:r>
+            <a:r>
+              <a:rPr lang="en-US" sz="1400" dirty="0"/>
+              <a:t> depends on </a:t>
+            </a:r>
+            <a:r>
+              <a:rPr lang="en-US" sz="1400" dirty="0" err="1"/>
+              <a:t>ExcelService</a:t>
+            </a:r>
+            <a:r>
+              <a:rPr lang="en-US" sz="1400" dirty="0"/>
+              <a:t> to retrieve data. Hence create an object for </a:t>
+            </a:r>
+            <a:r>
+              <a:rPr lang="en-US" sz="1400" dirty="0" err="1"/>
+              <a:t>ExcelService</a:t>
+            </a:r>
+            <a:r>
+              <a:rPr lang="en-US" sz="1400" dirty="0"/>
+              <a:t> from main program and inject it to </a:t>
+            </a:r>
+            <a:r>
+              <a:rPr lang="en-US" sz="1400" dirty="0" err="1"/>
+              <a:t>ExcelDataSource</a:t>
+            </a:r>
+            <a:r>
+              <a:rPr lang="en-US" sz="1400" dirty="0"/>
+              <a:t>.</a:t>
+            </a:r>
+          </a:p>
+          <a:p>
+            <a:r>
+              <a:rPr lang="en-US" sz="1400" dirty="0"/>
+              <a:t>Note: To not be directly dependent on </a:t>
+            </a:r>
+            <a:r>
+              <a:rPr lang="en-US" sz="1400" dirty="0" err="1"/>
+              <a:t>ExcelService</a:t>
+            </a:r>
+            <a:r>
+              <a:rPr lang="en-US" sz="1400" dirty="0"/>
+              <a:t>, we have </a:t>
+            </a:r>
+            <a:r>
+              <a:rPr lang="en-US" sz="1400" dirty="0" err="1"/>
+              <a:t>IDataService</a:t>
+            </a:r>
+            <a:r>
+              <a:rPr lang="en-US" sz="1400" dirty="0"/>
+              <a:t> and </a:t>
+            </a:r>
+            <a:r>
+              <a:rPr lang="en-US" sz="1400" dirty="0" err="1"/>
+              <a:t>ExcelService</a:t>
+            </a:r>
+            <a:r>
+              <a:rPr lang="en-US" sz="1400" dirty="0"/>
+              <a:t> implements it.</a:t>
+            </a:r>
+          </a:p>
+        </p:txBody>
+      </p:sp>
+      <p:pic>
+        <p:nvPicPr>
+          <p:cNvPr id="5" name="Picture 4">
+            <a:extLst>
+              <a:ext uri="{FF2B5EF4-FFF2-40B4-BE49-F238E27FC236}">
+                <a16:creationId xmlns:a16="http://schemas.microsoft.com/office/drawing/2014/main" id="{A0F15245-5E90-AFCA-50C8-F9B493EEC75B}"/>
+              </a:ext>
+            </a:extLst>
+          </p:cNvPr>
+          <p:cNvPicPr>
+            <a:picLocks noChangeAspect="1"/>
+          </p:cNvPicPr>
+          <p:nvPr/>
+        </p:nvPicPr>
+        <p:blipFill>
+          <a:blip r:embed="rId2">
+            <a:extLst>
+              <a:ext uri="{28A0092B-C50C-407E-A947-70E740481C1C}">
+                <a14:useLocalDpi xmlns:a14="http://schemas.microsoft.com/office/drawing/2010/main" val="0"/>
+              </a:ext>
+            </a:extLst>
+          </a:blip>
+          <a:srcRect/>
+          <a:stretch/>
+        </p:blipFill>
+        <p:spPr>
+          <a:xfrm>
+            <a:off x="366165" y="3522083"/>
+            <a:ext cx="5729835" cy="2578807"/>
+          </a:xfrm>
+          <a:prstGeom prst="rect">
+            <a:avLst/>
+          </a:prstGeom>
+          <a:ln>
+            <a:solidFill>
+              <a:schemeClr val="tx1"/>
+            </a:solidFill>
+          </a:ln>
+        </p:spPr>
+      </p:pic>
+      <p:pic>
+        <p:nvPicPr>
+          <p:cNvPr id="7" name="Picture 6">
+            <a:extLst>
+              <a:ext uri="{FF2B5EF4-FFF2-40B4-BE49-F238E27FC236}">
+                <a16:creationId xmlns:a16="http://schemas.microsoft.com/office/drawing/2014/main" id="{5EC3E407-0F10-D507-083F-FA3C7E9F61EA}"/>
+              </a:ext>
+            </a:extLst>
+          </p:cNvPr>
+          <p:cNvPicPr>
+            <a:picLocks noChangeAspect="1"/>
+          </p:cNvPicPr>
+          <p:nvPr/>
+        </p:nvPicPr>
+        <p:blipFill>
+          <a:blip r:embed="rId3">
+            <a:extLst>
+              <a:ext uri="{28A0092B-C50C-407E-A947-70E740481C1C}">
+                <a14:useLocalDpi xmlns:a14="http://schemas.microsoft.com/office/drawing/2010/main" val="0"/>
+              </a:ext>
+            </a:extLst>
+          </a:blip>
+          <a:srcRect/>
+          <a:stretch/>
+        </p:blipFill>
+        <p:spPr>
+          <a:xfrm>
+            <a:off x="6302830" y="3522083"/>
+            <a:ext cx="4724399" cy="2578807"/>
+          </a:xfrm>
+          <a:prstGeom prst="rect">
+            <a:avLst/>
+          </a:prstGeom>
+          <a:ln>
+            <a:solidFill>
+              <a:schemeClr val="tx1"/>
+            </a:solidFill>
+          </a:ln>
+        </p:spPr>
+      </p:pic>
+    </p:spTree>
+    <p:extLst>
+      <p:ext uri="{BB962C8B-B14F-4D97-AF65-F5344CB8AC3E}">
+        <p14:creationId xmlns:p14="http://schemas.microsoft.com/office/powerpoint/2010/main" val="1813991934"/>
+      </p:ext>
+    </p:extLst>
+  </p:cSld>
+  <p:clrMapOvr>
+    <a:masterClrMapping/>
+  </p:clrMapOvr>
+</p:sld>
+</file>
+
+<file path=ppt/slides/slide11.xml><?xml version="1.0" encoding="utf-8"?>
+<p:sld xmlns:a="http://schemas.openxmlformats.org/drawingml/2006/main" xmlns:r="http://schemas.openxmlformats.org/officeDocument/2006/relationships" xmlns:p="http://schemas.openxmlformats.org/presentationml/2006/main">
+  <p:cSld>
+    <p:spTree>
+      <p:nvGrpSpPr>
+        <p:cNvPr id="1" name=""/>
+        <p:cNvGrpSpPr/>
+        <p:nvPr/>
+      </p:nvGrpSpPr>
+      <p:grpSpPr>
+        <a:xfrm>
+          <a:off x="0" y="0"/>
+          <a:ext cx="0" cy="0"/>
+          <a:chOff x="0" y="0"/>
+          <a:chExt cx="0" cy="0"/>
+        </a:xfrm>
+      </p:grpSpPr>
+      <p:sp>
+        <p:nvSpPr>
+          <p:cNvPr id="2" name="Title 1">
+            <a:extLst>
+              <a:ext uri="{FF2B5EF4-FFF2-40B4-BE49-F238E27FC236}">
                 <a16:creationId xmlns:a16="http://schemas.microsoft.com/office/drawing/2014/main" id="{766276E5-C0C7-B7E3-42D5-405E894F483B}"/>
               </a:ext>
             </a:extLst>
@@ -6241,7 +6493,7 @@
 </p:sld>
 </file>
 
-<file path=ppt/slides/slide11.xml><?xml version="1.0" encoding="utf-8"?>
+<file path=ppt/slides/slide12.xml><?xml version="1.0" encoding="utf-8"?>
 <p:sld xmlns:a="http://schemas.openxmlformats.org/drawingml/2006/main" xmlns:r="http://schemas.openxmlformats.org/officeDocument/2006/relationships" xmlns:p="http://schemas.openxmlformats.org/presentationml/2006/main">
   <p:cSld>
     <p:spTree>
@@ -6404,6 +6656,11 @@
           <a:prstGeom prst="rect">
             <a:avLst/>
           </a:prstGeom>
+          <a:ln>
+            <a:solidFill>
+              <a:schemeClr val="tx1"/>
+            </a:solidFill>
+          </a:ln>
         </p:spPr>
       </p:pic>
     </p:spTree>
@@ -6419,7 +6676,7 @@
 </p:sld>
 </file>
 
-<file path=ppt/slides/slide12.xml><?xml version="1.0" encoding="utf-8"?>
+<file path=ppt/slides/slide13.xml><?xml version="1.0" encoding="utf-8"?>
 <p:sld xmlns:a="http://schemas.openxmlformats.org/drawingml/2006/main" xmlns:r="http://schemas.openxmlformats.org/officeDocument/2006/relationships" xmlns:p="http://schemas.openxmlformats.org/presentationml/2006/main">
   <p:cSld>
     <p:spTree>
@@ -6571,6 +6828,11 @@
           <a:prstGeom prst="rect">
             <a:avLst/>
           </a:prstGeom>
+          <a:ln>
+            <a:solidFill>
+              <a:schemeClr val="tx1"/>
+            </a:solidFill>
+          </a:ln>
         </p:spPr>
       </p:pic>
     </p:spTree>
@@ -6586,7 +6848,7 @@
 </p:sld>
 </file>
 
-<file path=ppt/slides/slide13.xml><?xml version="1.0" encoding="utf-8"?>
+<file path=ppt/slides/slide14.xml><?xml version="1.0" encoding="utf-8"?>
 <p:sld xmlns:a="http://schemas.openxmlformats.org/drawingml/2006/main" xmlns:r="http://schemas.openxmlformats.org/officeDocument/2006/relationships" xmlns:p="http://schemas.openxmlformats.org/presentationml/2006/main">
   <p:cSld>
     <p:spTree>
@@ -6896,7 +7158,7 @@
           <a:p>
             <a:r>
               <a:rPr lang="en-US" dirty="0"/>
-              <a:t>Read data from source</a:t>
+              <a:t>Read data from source - LINQ</a:t>
             </a:r>
           </a:p>
           <a:p>
@@ -8572,7 +8834,7 @@
           <p:cNvPr id="2" name="Title 1">
             <a:extLst>
               <a:ext uri="{FF2B5EF4-FFF2-40B4-BE49-F238E27FC236}">
-                <a16:creationId xmlns:a16="http://schemas.microsoft.com/office/drawing/2014/main" id="{5FCFCA12-4B9A-49F2-7998-485A0D8F28A4}"/>
+                <a16:creationId xmlns:a16="http://schemas.microsoft.com/office/drawing/2014/main" id="{2BE42716-4D78-20E3-6AAB-060EAB26E94A}"/>
               </a:ext>
             </a:extLst>
           </p:cNvPr>
@@ -8595,7 +8857,7 @@
           <a:p>
             <a:r>
               <a:rPr lang="en-US" dirty="0"/>
-              <a:t>Dependency injection:</a:t>
+              <a:t>LINQ:</a:t>
             </a:r>
           </a:p>
         </p:txBody>
@@ -8605,7 +8867,7 @@
           <p:cNvPr id="3" name="Content Placeholder 2">
             <a:extLst>
               <a:ext uri="{FF2B5EF4-FFF2-40B4-BE49-F238E27FC236}">
-                <a16:creationId xmlns:a16="http://schemas.microsoft.com/office/drawing/2014/main" id="{75F0B9BD-D0EB-D1A1-FEFB-8FF709A0A44B}"/>
+                <a16:creationId xmlns:a16="http://schemas.microsoft.com/office/drawing/2014/main" id="{43282F51-2F17-E82F-D3D2-571EA318EEE4}"/>
               </a:ext>
             </a:extLst>
           </p:cNvPr>
@@ -8618,8 +8880,8 @@
         </p:nvSpPr>
         <p:spPr>
           <a:xfrm>
-            <a:off x="677333" y="1480457"/>
-            <a:ext cx="9043609" cy="1687286"/>
+            <a:off x="677334" y="1524002"/>
+            <a:ext cx="8596668" cy="413655"/>
           </a:xfrm>
         </p:spPr>
         <p:txBody>
@@ -8629,77 +8891,10 @@
           <a:lstStyle/>
           <a:p>
             <a:r>
-              <a:rPr lang="en-US" sz="1400" dirty="0"/>
-              <a:t>Dependency Injection means dependencies are provided to a class from outside instead of being created inside the class.</a:t>
-            </a:r>
-          </a:p>
-          <a:p>
-            <a:r>
-              <a:rPr lang="en-US" sz="1400" dirty="0"/>
-              <a:t>Here, </a:t>
-            </a:r>
-            <a:r>
-              <a:rPr lang="en-US" sz="1400" dirty="0" err="1"/>
-              <a:t>ExcelDataSource</a:t>
-            </a:r>
-            <a:r>
-              <a:rPr lang="en-US" sz="1400" dirty="0"/>
-              <a:t> depends on </a:t>
-            </a:r>
-            <a:r>
-              <a:rPr lang="en-US" sz="1400" dirty="0" err="1"/>
-              <a:t>ExcelService</a:t>
-            </a:r>
-            <a:r>
-              <a:rPr lang="en-US" sz="1400" dirty="0"/>
-              <a:t> to retrieve data. Hence create an object for </a:t>
-            </a:r>
-            <a:r>
-              <a:rPr lang="en-US" sz="1400" dirty="0" err="1"/>
-              <a:t>ExcelService</a:t>
-            </a:r>
-            <a:r>
-              <a:rPr lang="en-US" sz="1400" dirty="0"/>
-              <a:t> from main program and inject it to </a:t>
-            </a:r>
-            <a:r>
-              <a:rPr lang="en-US" sz="1400" dirty="0" err="1"/>
-              <a:t>ExcelDataSource</a:t>
-            </a:r>
-            <a:r>
-              <a:rPr lang="en-US" sz="1400" dirty="0"/>
-              <a:t>.</a:t>
-            </a:r>
-          </a:p>
-          <a:p>
-            <a:r>
-              <a:rPr lang="en-US" sz="1400" dirty="0"/>
-              <a:t>Note: To not be just dependent on </a:t>
-            </a:r>
-            <a:r>
-              <a:rPr lang="en-US" sz="1400" dirty="0" err="1"/>
-              <a:t>ExcelService</a:t>
-            </a:r>
-            <a:r>
-              <a:rPr lang="en-US" sz="1400" dirty="0"/>
-              <a:t>, we have </a:t>
-            </a:r>
-            <a:r>
-              <a:rPr lang="en-US" sz="1400" dirty="0" err="1"/>
-              <a:t>IDataService</a:t>
-            </a:r>
-            <a:r>
-              <a:rPr lang="en-US" sz="1400" dirty="0"/>
-              <a:t> and </a:t>
-            </a:r>
-            <a:r>
-              <a:rPr lang="en-US" sz="1400" dirty="0" err="1"/>
-              <a:t>ExcelService</a:t>
-            </a:r>
-            <a:r>
-              <a:rPr lang="en-US" sz="1400" dirty="0"/>
-              <a:t> implements it.</a:t>
-            </a:r>
+              <a:rPr lang="en-US" sz="1600" b="1" dirty="0"/>
+              <a:t>LINQ allows us to iterate over collections and filter data.</a:t>
+            </a:r>
+            <a:endParaRPr lang="en-US" sz="1600" dirty="0"/>
           </a:p>
         </p:txBody>
       </p:sp>
@@ -8708,7 +8903,7 @@
           <p:cNvPr id="5" name="Picture 4">
             <a:extLst>
               <a:ext uri="{FF2B5EF4-FFF2-40B4-BE49-F238E27FC236}">
-                <a16:creationId xmlns:a16="http://schemas.microsoft.com/office/drawing/2014/main" id="{A0F15245-5E90-AFCA-50C8-F9B493EEC75B}"/>
+                <a16:creationId xmlns:a16="http://schemas.microsoft.com/office/drawing/2014/main" id="{0AF510E3-D942-66BE-A1B4-7DB4CDF0CE4F}"/>
               </a:ext>
             </a:extLst>
           </p:cNvPr>
@@ -8718,60 +8913,15 @@
           <p:nvPr/>
         </p:nvPicPr>
         <p:blipFill>
-          <a:blip r:embed="rId2">
-            <a:extLst>
-              <a:ext uri="{28A0092B-C50C-407E-A947-70E740481C1C}">
-                <a14:useLocalDpi xmlns:a14="http://schemas.microsoft.com/office/drawing/2010/main" val="0"/>
-              </a:ext>
-            </a:extLst>
-          </a:blip>
-          <a:srcRect/>
-          <a:stretch/>
+          <a:blip r:embed="rId2"/>
+          <a:stretch>
+            <a:fillRect/>
+          </a:stretch>
         </p:blipFill>
         <p:spPr>
           <a:xfrm>
-            <a:off x="366165" y="3522083"/>
-            <a:ext cx="5729835" cy="2578807"/>
-          </a:xfrm>
-          <a:prstGeom prst="rect">
-            <a:avLst/>
-          </a:prstGeom>
-          <a:ln>
-            <a:solidFill>
-              <a:schemeClr val="tx1"/>
-            </a:solidFill>
-          </a:ln>
-        </p:spPr>
-      </p:pic>
-      <p:pic>
-        <p:nvPicPr>
-          <p:cNvPr id="7" name="Picture 6">
-            <a:extLst>
-              <a:ext uri="{FF2B5EF4-FFF2-40B4-BE49-F238E27FC236}">
-                <a16:creationId xmlns:a16="http://schemas.microsoft.com/office/drawing/2014/main" id="{5EC3E407-0F10-D507-083F-FA3C7E9F61EA}"/>
-              </a:ext>
-            </a:extLst>
-          </p:cNvPr>
-          <p:cNvPicPr>
-            <a:picLocks noChangeAspect="1"/>
-          </p:cNvPicPr>
-          <p:nvPr/>
-        </p:nvPicPr>
-        <p:blipFill>
-          <a:blip r:embed="rId3">
-            <a:extLst>
-              <a:ext uri="{28A0092B-C50C-407E-A947-70E740481C1C}">
-                <a14:useLocalDpi xmlns:a14="http://schemas.microsoft.com/office/drawing/2010/main" val="0"/>
-              </a:ext>
-            </a:extLst>
-          </a:blip>
-          <a:srcRect/>
-          <a:stretch/>
-        </p:blipFill>
-        <p:spPr>
-          <a:xfrm>
-            <a:off x="6302830" y="3522083"/>
-            <a:ext cx="4724399" cy="2578807"/>
+            <a:off x="677334" y="2177145"/>
+            <a:ext cx="8005916" cy="3973284"/>
           </a:xfrm>
           <a:prstGeom prst="rect">
             <a:avLst/>
@@ -8786,7 +8936,7 @@
     </p:spTree>
     <p:extLst>
       <p:ext uri="{BB962C8B-B14F-4D97-AF65-F5344CB8AC3E}">
-        <p14:creationId xmlns:p14="http://schemas.microsoft.com/office/powerpoint/2010/main" val="1813991934"/>
+        <p14:creationId xmlns:p14="http://schemas.microsoft.com/office/powerpoint/2010/main" val="2410890493"/>
       </p:ext>
     </p:extLst>
   </p:cSld>

</xml_diff>

<commit_message>
Defined a global config class file
</commit_message>
<xml_diff>
--- a/notes/get partner details logics implemented.pptx
+++ b/notes/get partner details logics implemented.pptx
@@ -19,6 +19,7 @@
     <p:sldId id="266" r:id="rId13"/>
     <p:sldId id="268" r:id="rId14"/>
     <p:sldId id="269" r:id="rId15"/>
+    <p:sldId id="271" r:id="rId16"/>
   </p:sldIdLst>
   <p:sldSz cx="12192000" cy="6858000"/>
   <p:notesSz cx="6858000" cy="9144000"/>
@@ -903,7 +904,7 @@
           <a:p>
             <a:fld id="{3FF8D565-5F73-4F60-8A63-1AE02986B8ED}" type="datetimeFigureOut">
               <a:rPr lang="en-US" smtClean="0"/>
-              <a:t>1/23/2026</a:t>
+              <a:t>1/25/2026</a:t>
             </a:fld>
             <a:endParaRPr lang="en-US"/>
           </a:p>
@@ -1154,7 +1155,7 @@
           <a:p>
             <a:fld id="{3FF8D565-5F73-4F60-8A63-1AE02986B8ED}" type="datetimeFigureOut">
               <a:rPr lang="en-US" smtClean="0"/>
-              <a:t>1/23/2026</a:t>
+              <a:t>1/25/2026</a:t>
             </a:fld>
             <a:endParaRPr lang="en-US"/>
           </a:p>
@@ -1468,7 +1469,7 @@
           <a:p>
             <a:fld id="{3FF8D565-5F73-4F60-8A63-1AE02986B8ED}" type="datetimeFigureOut">
               <a:rPr lang="en-US" smtClean="0"/>
-              <a:t>1/23/2026</a:t>
+              <a:t>1/25/2026</a:t>
             </a:fld>
             <a:endParaRPr lang="en-US"/>
           </a:p>
@@ -1809,7 +1810,7 @@
           <a:p>
             <a:fld id="{3FF8D565-5F73-4F60-8A63-1AE02986B8ED}" type="datetimeFigureOut">
               <a:rPr lang="en-US" smtClean="0"/>
-              <a:t>1/23/2026</a:t>
+              <a:t>1/25/2026</a:t>
             </a:fld>
             <a:endParaRPr lang="en-US"/>
           </a:p>
@@ -2123,7 +2124,7 @@
           <a:p>
             <a:fld id="{3FF8D565-5F73-4F60-8A63-1AE02986B8ED}" type="datetimeFigureOut">
               <a:rPr lang="en-US" smtClean="0"/>
-              <a:t>1/23/2026</a:t>
+              <a:t>1/25/2026</a:t>
             </a:fld>
             <a:endParaRPr lang="en-US"/>
           </a:p>
@@ -2516,7 +2517,7 @@
           <a:p>
             <a:fld id="{3FF8D565-5F73-4F60-8A63-1AE02986B8ED}" type="datetimeFigureOut">
               <a:rPr lang="en-US" smtClean="0"/>
-              <a:t>1/23/2026</a:t>
+              <a:t>1/25/2026</a:t>
             </a:fld>
             <a:endParaRPr lang="en-US"/>
           </a:p>
@@ -2686,7 +2687,7 @@
           <a:p>
             <a:fld id="{3FF8D565-5F73-4F60-8A63-1AE02986B8ED}" type="datetimeFigureOut">
               <a:rPr lang="en-US" smtClean="0"/>
-              <a:t>1/23/2026</a:t>
+              <a:t>1/25/2026</a:t>
             </a:fld>
             <a:endParaRPr lang="en-US"/>
           </a:p>
@@ -2866,7 +2867,7 @@
           <a:p>
             <a:fld id="{3FF8D565-5F73-4F60-8A63-1AE02986B8ED}" type="datetimeFigureOut">
               <a:rPr lang="en-US" smtClean="0"/>
-              <a:t>1/23/2026</a:t>
+              <a:t>1/25/2026</a:t>
             </a:fld>
             <a:endParaRPr lang="en-US"/>
           </a:p>
@@ -3042,7 +3043,7 @@
           <a:p>
             <a:fld id="{3FF8D565-5F73-4F60-8A63-1AE02986B8ED}" type="datetimeFigureOut">
               <a:rPr lang="en-US" smtClean="0"/>
-              <a:t>1/23/2026</a:t>
+              <a:t>1/25/2026</a:t>
             </a:fld>
             <a:endParaRPr lang="en-US"/>
           </a:p>
@@ -3289,7 +3290,7 @@
           <a:p>
             <a:fld id="{3FF8D565-5F73-4F60-8A63-1AE02986B8ED}" type="datetimeFigureOut">
               <a:rPr lang="en-US" smtClean="0"/>
-              <a:t>1/23/2026</a:t>
+              <a:t>1/25/2026</a:t>
             </a:fld>
             <a:endParaRPr lang="en-US"/>
           </a:p>
@@ -3521,7 +3522,7 @@
           <a:p>
             <a:fld id="{3FF8D565-5F73-4F60-8A63-1AE02986B8ED}" type="datetimeFigureOut">
               <a:rPr lang="en-US" smtClean="0"/>
-              <a:t>1/23/2026</a:t>
+              <a:t>1/25/2026</a:t>
             </a:fld>
             <a:endParaRPr lang="en-US"/>
           </a:p>
@@ -3895,7 +3896,7 @@
           <a:p>
             <a:fld id="{3FF8D565-5F73-4F60-8A63-1AE02986B8ED}" type="datetimeFigureOut">
               <a:rPr lang="en-US" smtClean="0"/>
-              <a:t>1/23/2026</a:t>
+              <a:t>1/25/2026</a:t>
             </a:fld>
             <a:endParaRPr lang="en-US"/>
           </a:p>
@@ -4018,7 +4019,7 @@
           <a:p>
             <a:fld id="{3FF8D565-5F73-4F60-8A63-1AE02986B8ED}" type="datetimeFigureOut">
               <a:rPr lang="en-US" smtClean="0"/>
-              <a:t>1/23/2026</a:t>
+              <a:t>1/25/2026</a:t>
             </a:fld>
             <a:endParaRPr lang="en-US"/>
           </a:p>
@@ -4113,7 +4114,7 @@
           <a:p>
             <a:fld id="{3FF8D565-5F73-4F60-8A63-1AE02986B8ED}" type="datetimeFigureOut">
               <a:rPr lang="en-US" smtClean="0"/>
-              <a:t>1/23/2026</a:t>
+              <a:t>1/25/2026</a:t>
             </a:fld>
             <a:endParaRPr lang="en-US"/>
           </a:p>
@@ -4368,7 +4369,7 @@
           <a:p>
             <a:fld id="{3FF8D565-5F73-4F60-8A63-1AE02986B8ED}" type="datetimeFigureOut">
               <a:rPr lang="en-US" smtClean="0"/>
-              <a:t>1/23/2026</a:t>
+              <a:t>1/25/2026</a:t>
             </a:fld>
             <a:endParaRPr lang="en-US"/>
           </a:p>
@@ -4631,7 +4632,7 @@
           <a:p>
             <a:fld id="{3FF8D565-5F73-4F60-8A63-1AE02986B8ED}" type="datetimeFigureOut">
               <a:rPr lang="en-US" smtClean="0"/>
-              <a:t>1/23/2026</a:t>
+              <a:t>1/25/2026</a:t>
             </a:fld>
             <a:endParaRPr lang="en-US"/>
           </a:p>
@@ -5430,7 +5431,7 @@
           <a:p>
             <a:fld id="{3FF8D565-5F73-4F60-8A63-1AE02986B8ED}" type="datetimeFigureOut">
               <a:rPr lang="en-US" smtClean="0"/>
-              <a:t>1/23/2026</a:t>
+              <a:t>1/25/2026</a:t>
             </a:fld>
             <a:endParaRPr lang="en-US"/>
           </a:p>
@@ -7069,6 +7070,190 @@
 </p:sld>
 </file>
 
+<file path=ppt/slides/slide15.xml><?xml version="1.0" encoding="utf-8"?>
+<p:sld xmlns:a="http://schemas.openxmlformats.org/drawingml/2006/main" xmlns:r="http://schemas.openxmlformats.org/officeDocument/2006/relationships" xmlns:p="http://schemas.openxmlformats.org/presentationml/2006/main">
+  <p:cSld>
+    <p:spTree>
+      <p:nvGrpSpPr>
+        <p:cNvPr id="1" name=""/>
+        <p:cNvGrpSpPr/>
+        <p:nvPr/>
+      </p:nvGrpSpPr>
+      <p:grpSpPr>
+        <a:xfrm>
+          <a:off x="0" y="0"/>
+          <a:ext cx="0" cy="0"/>
+          <a:chOff x="0" y="0"/>
+          <a:chExt cx="0" cy="0"/>
+        </a:xfrm>
+      </p:grpSpPr>
+      <p:sp>
+        <p:nvSpPr>
+          <p:cNvPr id="2" name="Title 1">
+            <a:extLst>
+              <a:ext uri="{FF2B5EF4-FFF2-40B4-BE49-F238E27FC236}">
+                <a16:creationId xmlns:a16="http://schemas.microsoft.com/office/drawing/2014/main" id="{CE9B0FCC-999C-7966-9DEA-94B804DDBB64}"/>
+              </a:ext>
+            </a:extLst>
+          </p:cNvPr>
+          <p:cNvSpPr>
+            <a:spLocks noGrp="1"/>
+          </p:cNvSpPr>
+          <p:nvPr>
+            <p:ph type="title"/>
+          </p:nvPr>
+        </p:nvSpPr>
+        <p:spPr>
+          <a:xfrm>
+            <a:off x="677334" y="609600"/>
+            <a:ext cx="8596668" cy="620486"/>
+          </a:xfrm>
+        </p:spPr>
+        <p:txBody>
+          <a:bodyPr>
+            <a:normAutofit fontScale="90000"/>
+          </a:bodyPr>
+          <a:lstStyle/>
+          <a:p>
+            <a:r>
+              <a:rPr lang="en-US" dirty="0"/>
+              <a:t>App Config:</a:t>
+            </a:r>
+          </a:p>
+        </p:txBody>
+      </p:sp>
+      <p:sp>
+        <p:nvSpPr>
+          <p:cNvPr id="3" name="Content Placeholder 2">
+            <a:extLst>
+              <a:ext uri="{FF2B5EF4-FFF2-40B4-BE49-F238E27FC236}">
+                <a16:creationId xmlns:a16="http://schemas.microsoft.com/office/drawing/2014/main" id="{81991CAF-E352-8B18-B8F2-C7B30F39A21D}"/>
+              </a:ext>
+            </a:extLst>
+          </p:cNvPr>
+          <p:cNvSpPr>
+            <a:spLocks noGrp="1"/>
+          </p:cNvSpPr>
+          <p:nvPr>
+            <p:ph idx="1"/>
+          </p:nvPr>
+        </p:nvSpPr>
+        <p:spPr>
+          <a:xfrm>
+            <a:off x="677333" y="1415143"/>
+            <a:ext cx="8978295" cy="1132113"/>
+          </a:xfrm>
+        </p:spPr>
+        <p:txBody>
+          <a:bodyPr>
+            <a:normAutofit/>
+          </a:bodyPr>
+          <a:lstStyle/>
+          <a:p>
+            <a:r>
+              <a:rPr lang="en-US" dirty="0"/>
+              <a:t>To keep the config global, we use static class and define the values as properties. This eliminates dependency injection of </a:t>
+            </a:r>
+            <a:r>
+              <a:rPr lang="en-US" dirty="0" err="1"/>
+              <a:t>IConfiguration</a:t>
+            </a:r>
+            <a:r>
+              <a:rPr lang="en-US" dirty="0"/>
+              <a:t>.</a:t>
+            </a:r>
+          </a:p>
+          <a:p>
+            <a:r>
+              <a:rPr lang="en-US" dirty="0"/>
+              <a:t>Properties ensure value is read from config every time and not cached.</a:t>
+            </a:r>
+          </a:p>
+        </p:txBody>
+      </p:sp>
+      <p:pic>
+        <p:nvPicPr>
+          <p:cNvPr id="5" name="Picture 4">
+            <a:extLst>
+              <a:ext uri="{FF2B5EF4-FFF2-40B4-BE49-F238E27FC236}">
+                <a16:creationId xmlns:a16="http://schemas.microsoft.com/office/drawing/2014/main" id="{B084985E-5FA8-572B-42C9-983FBFA11625}"/>
+              </a:ext>
+            </a:extLst>
+          </p:cNvPr>
+          <p:cNvPicPr>
+            <a:picLocks noChangeAspect="1"/>
+          </p:cNvPicPr>
+          <p:nvPr/>
+        </p:nvPicPr>
+        <p:blipFill>
+          <a:blip r:embed="rId2"/>
+          <a:stretch>
+            <a:fillRect/>
+          </a:stretch>
+        </p:blipFill>
+        <p:spPr>
+          <a:xfrm>
+            <a:off x="674912" y="2809623"/>
+            <a:ext cx="4567232" cy="3015341"/>
+          </a:xfrm>
+          <a:prstGeom prst="rect">
+            <a:avLst/>
+          </a:prstGeom>
+          <a:ln>
+            <a:solidFill>
+              <a:schemeClr val="tx1"/>
+            </a:solidFill>
+          </a:ln>
+        </p:spPr>
+      </p:pic>
+      <p:pic>
+        <p:nvPicPr>
+          <p:cNvPr id="7" name="Picture 6">
+            <a:extLst>
+              <a:ext uri="{FF2B5EF4-FFF2-40B4-BE49-F238E27FC236}">
+                <a16:creationId xmlns:a16="http://schemas.microsoft.com/office/drawing/2014/main" id="{60BF85E2-D0BF-5073-E295-121B696C31B4}"/>
+              </a:ext>
+            </a:extLst>
+          </p:cNvPr>
+          <p:cNvPicPr>
+            <a:picLocks noChangeAspect="1"/>
+          </p:cNvPicPr>
+          <p:nvPr/>
+        </p:nvPicPr>
+        <p:blipFill>
+          <a:blip r:embed="rId3"/>
+          <a:stretch>
+            <a:fillRect/>
+          </a:stretch>
+        </p:blipFill>
+        <p:spPr>
+          <a:xfrm>
+            <a:off x="5595256" y="2809623"/>
+            <a:ext cx="4648202" cy="3321249"/>
+          </a:xfrm>
+          <a:prstGeom prst="rect">
+            <a:avLst/>
+          </a:prstGeom>
+          <a:ln>
+            <a:solidFill>
+              <a:schemeClr val="tx1"/>
+            </a:solidFill>
+          </a:ln>
+        </p:spPr>
+      </p:pic>
+    </p:spTree>
+    <p:extLst>
+      <p:ext uri="{BB962C8B-B14F-4D97-AF65-F5344CB8AC3E}">
+        <p14:creationId xmlns:p14="http://schemas.microsoft.com/office/powerpoint/2010/main" val="4058500999"/>
+      </p:ext>
+    </p:extLst>
+  </p:cSld>
+  <p:clrMapOvr>
+    <a:masterClrMapping/>
+  </p:clrMapOvr>
+</p:sld>
+</file>
+
 <file path=ppt/slides/slide2.xml><?xml version="1.0" encoding="utf-8"?>
 <p:sld xmlns:a="http://schemas.openxmlformats.org/drawingml/2006/main" xmlns:r="http://schemas.openxmlformats.org/officeDocument/2006/relationships" xmlns:p="http://schemas.openxmlformats.org/presentationml/2006/main">
   <p:cSld>
@@ -7132,7 +7317,9 @@
         </p:nvSpPr>
         <p:spPr/>
         <p:txBody>
-          <a:bodyPr/>
+          <a:bodyPr>
+            <a:normAutofit lnSpcReduction="10000"/>
+          </a:bodyPr>
           <a:lstStyle/>
           <a:p>
             <a:pPr marL="0" indent="0">
@@ -7189,6 +7376,12 @@
             <a:r>
               <a:rPr lang="en-US" dirty="0"/>
               <a:t>SNRF generation and printing</a:t>
+            </a:r>
+          </a:p>
+          <a:p>
+            <a:r>
+              <a:rPr lang="en-US" dirty="0"/>
+              <a:t>App config</a:t>
             </a:r>
           </a:p>
           <a:p>

</xml_diff>